<commit_message>
44cafe 2014 presentation slides on CVE-2014-0160
</commit_message>
<xml_diff>
--- a/presentations/44cafe-HeartBleed.pptx
+++ b/presentations/44cafe-HeartBleed.pptx
@@ -2592,15 +2592,15 @@
           <a:p>
             <a:r>
               <a:rPr lang="en-US" dirty="0" smtClean="0"/>
-              <a:t>Search for key size/2 primes in memory leak and use to determine remaining prime from modulo n (q % n == 0) – with p &amp; q </a:t>
-            </a:r>
-            <a:r>
-              <a:rPr lang="en-US" smtClean="0"/>
-              <a:t>we generate </a:t>
-            </a:r>
-            <a:r>
-              <a:rPr lang="en-US" dirty="0" smtClean="0"/>
-              <a:t>RSA private key. </a:t>
+              <a:t>Search for key </a:t>
+            </a:r>
+            <a:r>
+              <a:rPr lang="en-US" dirty="0" smtClean="0"/>
+              <a:t>size </a:t>
+            </a:r>
+            <a:r>
+              <a:rPr lang="en-US" dirty="0" smtClean="0"/>
+              <a:t>primes in memory leak and use to determine remaining prime from modulo n (q % n == 0) – with p &amp; q we generate RSA private key. </a:t>
             </a:r>
             <a:endParaRPr lang="en-US" dirty="0"/>
           </a:p>
@@ -2786,8 +2786,13 @@
             </a:r>
             <a:r>
               <a:rPr lang="en-US" dirty="0" smtClean="0"/>
-              <a:t> to produce valid RSA private keys.</a:t>
-            </a:r>
+              <a:t> to produce valid RSA private </a:t>
+            </a:r>
+            <a:r>
+              <a:rPr lang="en-US" dirty="0" smtClean="0"/>
+              <a:t>keys instead of counting primes.</a:t>
+            </a:r>
+            <a:endParaRPr lang="en-US" dirty="0" smtClean="0"/>
           </a:p>
           <a:p>
             <a:endParaRPr lang="en-US" dirty="0"/>
@@ -2807,7 +2812,19 @@
             </a:r>
             <a:r>
               <a:rPr lang="en-US" dirty="0" smtClean="0"/>
-              <a:t>” on a memory dump which tests possible values against the certificate modulus n to identify if modulo is 0. The value and its division result by n are checked and if primes we have p &amp; q.</a:t>
+              <a:t>” on a memory dump </a:t>
+            </a:r>
+            <a:r>
+              <a:rPr lang="en-US" dirty="0" smtClean="0"/>
+              <a:t>to</a:t>
+            </a:r>
+            <a:r>
+              <a:rPr lang="en-US" dirty="0" smtClean="0"/>
+              <a:t> test </a:t>
+            </a:r>
+            <a:r>
+              <a:rPr lang="en-US" dirty="0" smtClean="0"/>
+              <a:t>possible values against the certificate modulus n to identify if modulo is 0. The value and its division result by n are checked and if primes we have p &amp; q.</a:t>
             </a:r>
           </a:p>
           <a:p>
@@ -2835,23 +2852,7 @@
             </a:r>
             <a:r>
               <a:rPr lang="en-US" dirty="0" smtClean="0"/>
-              <a:t> </a:t>
-            </a:r>
-            <a:r>
-              <a:rPr lang="en-US" smtClean="0"/>
-              <a:t>module </a:t>
-            </a:r>
-            <a:r>
-              <a:rPr lang="en-US" smtClean="0"/>
-              <a:t>also supports </a:t>
-            </a:r>
-            <a:r>
-              <a:rPr lang="en-US" dirty="0" smtClean="0"/>
-              <a:t>dumping private </a:t>
-            </a:r>
-            <a:r>
-              <a:rPr lang="en-US" dirty="0" smtClean="0"/>
-              <a:t>keys.</a:t>
+              <a:t> module also supports dumping private keys.</a:t>
             </a:r>
             <a:endParaRPr lang="en-US" dirty="0"/>
           </a:p>
@@ -3229,6 +3230,13 @@
   <p:clrMapOvr>
     <a:masterClrMapping/>
   </p:clrMapOvr>
+  <p:timing>
+    <p:tnLst>
+      <p:par>
+        <p:cTn xmlns:p14="http://schemas.microsoft.com/office/powerpoint/2010/main" id="1" dur="indefinite" restart="never" nodeType="tmRoot"/>
+      </p:par>
+    </p:tnLst>
+  </p:timing>
 </p:sld>
 </file>
 

</xml_diff>